<commit_message>
Updated 'science/DataScienceSF-Full-Web.pptx' via CloudCannon
</commit_message>
<xml_diff>
--- a/science/DataScienceSF-Full-Web.pptx
+++ b/science/DataScienceSF-Full-Web.pptx
@@ -5,10 +5,10 @@
     <p:sldMasterId id="2147483648" r:id="rId1"/>
   </p:sldMasterIdLst>
   <p:notesMasterIdLst>
-    <p:notesMasterId r:id="rId40"/>
+    <p:notesMasterId r:id="rId41"/>
   </p:notesMasterIdLst>
   <p:handoutMasterIdLst>
-    <p:handoutMasterId r:id="rId41"/>
+    <p:handoutMasterId r:id="rId42"/>
   </p:handoutMasterIdLst>
   <p:sldIdLst>
     <p:sldId id="612" r:id="rId2"/>
@@ -48,7 +48,8 @@
     <p:sldId id="627" r:id="rId36"/>
     <p:sldId id="603" r:id="rId37"/>
     <p:sldId id="604" r:id="rId38"/>
-    <p:sldId id="605" r:id="rId39"/>
+    <p:sldId id="629" r:id="rId39"/>
+    <p:sldId id="605" r:id="rId40"/>
   </p:sldIdLst>
   <p:sldSz cx="9144000" cy="6858000" type="screen4x3"/>
   <p:notesSz cx="7010400" cy="9296400"/>
@@ -4139,7 +4140,7 @@
             <a:fld id="{B6862D3E-A707-4E6B-B4B6-B6558A683E4C}" type="datetimeFigureOut">
               <a:rPr lang="en-US" smtClean="0"/>
               <a:pPr/>
-              <a:t>4/19/2017</a:t>
+              <a:t>4/24/2017</a:t>
             </a:fld>
             <a:endParaRPr lang="en-US"/>
           </a:p>
@@ -4306,7 +4307,7 @@
             <a:fld id="{5870C3A5-17CA-4F39-AFD7-F81AEEEE2563}" type="datetimeFigureOut">
               <a:rPr lang="en-US" smtClean="0"/>
               <a:pPr/>
-              <a:t>4/19/2017</a:t>
+              <a:t>4/24/2017</a:t>
             </a:fld>
             <a:endParaRPr lang="en-US"/>
           </a:p>
@@ -6531,7 +6532,7 @@
             <a:fld id="{DBF593A7-CAE9-496C-99F3-C511B4CA38DD}" type="datetimeFigureOut">
               <a:rPr lang="en-US" smtClean="0"/>
               <a:pPr/>
-              <a:t>4/19/2017</a:t>
+              <a:t>4/24/2017</a:t>
             </a:fld>
             <a:endParaRPr lang="en-US"/>
           </a:p>
@@ -6793,7 +6794,7 @@
             <a:fld id="{DBF593A7-CAE9-496C-99F3-C511B4CA38DD}" type="datetimeFigureOut">
               <a:rPr lang="en-US" smtClean="0"/>
               <a:pPr/>
-              <a:t>4/19/2017</a:t>
+              <a:t>4/24/2017</a:t>
             </a:fld>
             <a:endParaRPr lang="en-US"/>
           </a:p>
@@ -6976,7 +6977,7 @@
             <a:fld id="{DBF593A7-CAE9-496C-99F3-C511B4CA38DD}" type="datetimeFigureOut">
               <a:rPr lang="en-US" smtClean="0"/>
               <a:pPr/>
-              <a:t>4/19/2017</a:t>
+              <a:t>4/24/2017</a:t>
             </a:fld>
             <a:endParaRPr lang="en-US"/>
           </a:p>
@@ -7165,7 +7166,7 @@
             <a:fld id="{DBF593A7-CAE9-496C-99F3-C511B4CA38DD}" type="datetimeFigureOut">
               <a:rPr lang="en-US" smtClean="0"/>
               <a:pPr/>
-              <a:t>4/19/2017</a:t>
+              <a:t>4/24/2017</a:t>
             </a:fld>
             <a:endParaRPr lang="en-US"/>
           </a:p>
@@ -7508,7 +7509,7 @@
             <a:fld id="{DBF593A7-CAE9-496C-99F3-C511B4CA38DD}" type="datetimeFigureOut">
               <a:rPr lang="en-US" smtClean="0"/>
               <a:pPr/>
-              <a:t>4/19/2017</a:t>
+              <a:t>4/24/2017</a:t>
             </a:fld>
             <a:endParaRPr lang="en-US"/>
           </a:p>
@@ -7767,7 +7768,7 @@
             <a:fld id="{DBF593A7-CAE9-496C-99F3-C511B4CA38DD}" type="datetimeFigureOut">
               <a:rPr lang="en-US" smtClean="0"/>
               <a:pPr/>
-              <a:t>4/19/2017</a:t>
+              <a:t>4/24/2017</a:t>
             </a:fld>
             <a:endParaRPr lang="en-US"/>
           </a:p>
@@ -8104,7 +8105,7 @@
             <a:fld id="{DBF593A7-CAE9-496C-99F3-C511B4CA38DD}" type="datetimeFigureOut">
               <a:rPr lang="en-US" smtClean="0"/>
               <a:pPr/>
-              <a:t>4/19/2017</a:t>
+              <a:t>4/24/2017</a:t>
             </a:fld>
             <a:endParaRPr lang="en-US"/>
           </a:p>
@@ -8583,7 +8584,7 @@
             <a:fld id="{DBF593A7-CAE9-496C-99F3-C511B4CA38DD}" type="datetimeFigureOut">
               <a:rPr lang="en-US" smtClean="0"/>
               <a:pPr/>
-              <a:t>4/19/2017</a:t>
+              <a:t>4/24/2017</a:t>
             </a:fld>
             <a:endParaRPr lang="en-US"/>
           </a:p>
@@ -8687,7 +8688,7 @@
             <a:fld id="{DBF593A7-CAE9-496C-99F3-C511B4CA38DD}" type="datetimeFigureOut">
               <a:rPr lang="en-US" smtClean="0"/>
               <a:pPr/>
-              <a:t>4/19/2017</a:t>
+              <a:t>4/24/2017</a:t>
             </a:fld>
             <a:endParaRPr lang="en-US"/>
           </a:p>
@@ -8819,7 +8820,7 @@
             <a:fld id="{DBF593A7-CAE9-496C-99F3-C511B4CA38DD}" type="datetimeFigureOut">
               <a:rPr lang="en-US" smtClean="0"/>
               <a:pPr/>
-              <a:t>4/19/2017</a:t>
+              <a:t>4/24/2017</a:t>
             </a:fld>
             <a:endParaRPr lang="en-US"/>
           </a:p>
@@ -8951,7 +8952,7 @@
             <a:fld id="{DBF593A7-CAE9-496C-99F3-C511B4CA38DD}" type="datetimeFigureOut">
               <a:rPr lang="en-US" smtClean="0"/>
               <a:pPr/>
-              <a:t>4/19/2017</a:t>
+              <a:t>4/24/2017</a:t>
             </a:fld>
             <a:endParaRPr lang="en-US"/>
           </a:p>
@@ -9237,7 +9238,7 @@
             <a:fld id="{DBF593A7-CAE9-496C-99F3-C511B4CA38DD}" type="datetimeFigureOut">
               <a:rPr lang="en-US" smtClean="0"/>
               <a:pPr/>
-              <a:t>4/19/2017</a:t>
+              <a:t>4/24/2017</a:t>
             </a:fld>
             <a:endParaRPr lang="en-US"/>
           </a:p>
@@ -9462,7 +9463,7 @@
             <a:fld id="{DBF593A7-CAE9-496C-99F3-C511B4CA38DD}" type="datetimeFigureOut">
               <a:rPr lang="en-US" smtClean="0"/>
               <a:pPr/>
-              <a:t>4/19/2017</a:t>
+              <a:t>4/24/2017</a:t>
             </a:fld>
             <a:endParaRPr lang="en-US"/>
           </a:p>
@@ -39964,6 +39965,143 @@
           <a:chExt cx="0" cy="0"/>
         </a:xfrm>
       </p:grpSpPr>
+      <p:sp>
+        <p:nvSpPr>
+          <p:cNvPr id="2" name="Title 1"/>
+          <p:cNvSpPr>
+            <a:spLocks noGrp="1"/>
+          </p:cNvSpPr>
+          <p:nvPr>
+            <p:ph type="title"/>
+          </p:nvPr>
+        </p:nvSpPr>
+        <p:spPr/>
+        <p:txBody>
+          <a:bodyPr/>
+          <a:lstStyle/>
+          <a:p>
+            <a:r>
+              <a:rPr lang="en-US" dirty="0" smtClean="0"/>
+              <a:t>Visit datasf.org/science</a:t>
+            </a:r>
+            <a:endParaRPr lang="en-US" dirty="0"/>
+          </a:p>
+        </p:txBody>
+      </p:sp>
+      <p:sp>
+        <p:nvSpPr>
+          <p:cNvPr id="3" name="Content Placeholder 2"/>
+          <p:cNvSpPr>
+            <a:spLocks noGrp="1"/>
+          </p:cNvSpPr>
+          <p:nvPr>
+            <p:ph idx="1"/>
+          </p:nvPr>
+        </p:nvSpPr>
+        <p:spPr/>
+        <p:txBody>
+          <a:bodyPr/>
+          <a:lstStyle/>
+          <a:p>
+            <a:pPr marL="0" indent="0">
+              <a:buNone/>
+            </a:pPr>
+            <a:r>
+              <a:rPr lang="en-US" dirty="0" smtClean="0"/>
+              <a:t>At datasf.org/science:</a:t>
+            </a:r>
+          </a:p>
+          <a:p>
+            <a:r>
+              <a:rPr lang="en-US" dirty="0" smtClean="0"/>
+              <a:t>This </a:t>
+            </a:r>
+            <a:r>
+              <a:rPr lang="en-US" dirty="0" err="1" smtClean="0"/>
+              <a:t>powerpoint</a:t>
+            </a:r>
+            <a:endParaRPr lang="en-US" dirty="0"/>
+          </a:p>
+          <a:p>
+            <a:r>
+              <a:rPr lang="en-US" dirty="0" smtClean="0"/>
+              <a:t>1 pager</a:t>
+            </a:r>
+          </a:p>
+          <a:p>
+            <a:r>
+              <a:rPr lang="en-US" dirty="0" smtClean="0"/>
+              <a:t>Sign up for office hours</a:t>
+            </a:r>
+          </a:p>
+          <a:p>
+            <a:r>
+              <a:rPr lang="en-US" dirty="0" smtClean="0"/>
+              <a:t>Sign up for brown bag</a:t>
+            </a:r>
+          </a:p>
+          <a:p>
+            <a:r>
+              <a:rPr lang="en-US" dirty="0" smtClean="0"/>
+              <a:t>Apply!</a:t>
+            </a:r>
+          </a:p>
+        </p:txBody>
+      </p:sp>
+      <p:pic>
+        <p:nvPicPr>
+          <p:cNvPr id="4" name="Picture 3"/>
+          <p:cNvPicPr>
+            <a:picLocks noChangeAspect="1"/>
+          </p:cNvPicPr>
+          <p:nvPr/>
+        </p:nvPicPr>
+        <p:blipFill>
+          <a:blip r:embed="rId2"/>
+          <a:stretch>
+            <a:fillRect/>
+          </a:stretch>
+        </p:blipFill>
+        <p:spPr>
+          <a:xfrm>
+            <a:off x="4572000" y="1361585"/>
+            <a:ext cx="4454144" cy="4876800"/>
+          </a:xfrm>
+          <a:prstGeom prst="rect">
+            <a:avLst/>
+          </a:prstGeom>
+        </p:spPr>
+      </p:pic>
+    </p:spTree>
+    <p:extLst>
+      <p:ext uri="{BB962C8B-B14F-4D97-AF65-F5344CB8AC3E}">
+        <p14:creationId xmlns:p14="http://schemas.microsoft.com/office/powerpoint/2010/main" val="2787479459"/>
+      </p:ext>
+    </p:extLst>
+  </p:cSld>
+  <p:clrMapOvr>
+    <a:masterClrMapping/>
+  </p:clrMapOvr>
+</p:sld>
+</file>
+
+<file path=ppt/slides/slide39.xml><?xml version="1.0" encoding="utf-8"?>
+<p:sld xmlns:a="http://schemas.openxmlformats.org/drawingml/2006/main" xmlns:r="http://schemas.openxmlformats.org/officeDocument/2006/relationships" xmlns:p="http://schemas.openxmlformats.org/presentationml/2006/main">
+  <p:cSld>
+    <p:spTree>
+      <p:nvGrpSpPr>
+        <p:cNvPr id="1" name=""/>
+        <p:cNvGrpSpPr/>
+        <p:nvPr/>
+      </p:nvGrpSpPr>
+      <p:grpSpPr>
+        <a:xfrm>
+          <a:off x="0" y="0"/>
+          <a:ext cx="0" cy="0"/>
+          <a:chOff x="0" y="0"/>
+          <a:chExt cx="0" cy="0"/>
+        </a:xfrm>
+      </p:grpSpPr>
       <p:pic>
         <p:nvPicPr>
           <p:cNvPr id="4098" name="Picture 2" descr="Announcing our Year 2 Strategic Plan!"/>
@@ -43315,15 +43453,15 @@
                   <a:srgbClr val="326D89"/>
                 </a:solidFill>
               </a:rPr>
-              <a:t>Ride </a:t>
-            </a:r>
-            <a:r>
-              <a:rPr lang="en-US" sz="2500" b="1" dirty="0" err="1" smtClean="0">
+              <a:t>Ride-</a:t>
+            </a:r>
+            <a:r>
+              <a:rPr lang="en-US" sz="2500" b="1" smtClean="0">
                 <a:solidFill>
                   <a:srgbClr val="326D89"/>
                 </a:solidFill>
               </a:rPr>
-              <a:t>Alongs</a:t>
+              <a:t>alongs</a:t>
             </a:r>
             <a:endParaRPr lang="en-US" sz="2500" b="1" dirty="0" smtClean="0">
               <a:solidFill>

</xml_diff>